<commit_message>
Update ppt and doc
</commit_message>
<xml_diff>
--- a/Presentation.pptx
+++ b/Presentation.pptx
@@ -232,7 +232,7 @@
           <a:p>
             <a:fld id="{458C8C0B-E7A1-4E81-AB6F-6479A52F298B}" type="datetimeFigureOut">
               <a:rPr lang="zh-CN" altLang="en-US" smtClean="0"/>
-              <a:t>2024/12/16</a:t>
+              <a:t>2024/12/17</a:t>
             </a:fld>
             <a:endParaRPr lang="zh-CN" altLang="en-US"/>
           </a:p>
@@ -5614,6 +5614,48 @@
                 <a:srgbClr val="0070C0"/>
               </a:solidFill>
             </a:endParaRPr>
+          </a:p>
+        </p:txBody>
+      </p:sp>
+      <p:sp>
+        <p:nvSpPr>
+          <p:cNvPr id="16" name="文本框 15">
+            <a:extLst>
+              <a:ext uri="{FF2B5EF4-FFF2-40B4-BE49-F238E27FC236}">
+                <a16:creationId xmlns:a16="http://schemas.microsoft.com/office/drawing/2014/main" id="{EDD679B8-D522-4BDC-99B2-D6D06FE62537}"/>
+              </a:ext>
+            </a:extLst>
+          </p:cNvPr>
+          <p:cNvSpPr txBox="1"/>
+          <p:nvPr/>
+        </p:nvSpPr>
+        <p:spPr>
+          <a:xfrm>
+            <a:off x="1" y="6550223"/>
+            <a:ext cx="4043844" cy="307777"/>
+          </a:xfrm>
+          <a:prstGeom prst="rect">
+            <a:avLst/>
+          </a:prstGeom>
+          <a:noFill/>
+        </p:spPr>
+        <p:txBody>
+          <a:bodyPr wrap="square">
+            <a:spAutoFit/>
+          </a:bodyPr>
+          <a:lstStyle/>
+          <a:p>
+            <a:r>
+              <a:rPr lang="en-US" altLang="zh-CN" sz="1400" dirty="0">
+                <a:solidFill>
+                  <a:schemeClr val="accent5">
+                    <a:lumMod val="60000"/>
+                    <a:lumOff val="40000"/>
+                  </a:schemeClr>
+                </a:solidFill>
+              </a:rPr>
+              <a:t>Contact: minmuslin@outlook.com</a:t>
+            </a:r>
           </a:p>
         </p:txBody>
       </p:sp>

</xml_diff>